<commit_message>
small changes first BNN implementation
</commit_message>
<xml_diff>
--- a/_workingFolder/Step_graphical_documentation_v3.pptx
+++ b/_workingFolder/Step_graphical_documentation_v3.pptx
@@ -210,7 +210,7 @@
           <a:p>
             <a:fld id="{D0A502E1-59B7-4ABA-A96A-799E7A637A28}" type="datetimeFigureOut">
               <a:rPr lang="de-CH" smtClean="0"/>
-              <a:t>19.11.2023</a:t>
+              <a:t>17.12.2023</a:t>
             </a:fld>
             <a:endParaRPr lang="de-CH"/>
           </a:p>
@@ -1473,7 +1473,7 @@
           <a:p>
             <a:fld id="{1540B91B-16B7-420D-92EE-189A5973844B}" type="datetimeFigureOut">
               <a:rPr lang="de-CH" smtClean="0"/>
-              <a:t>19.11.2023</a:t>
+              <a:t>17.12.2023</a:t>
             </a:fld>
             <a:endParaRPr lang="de-CH"/>
           </a:p>
@@ -1673,7 +1673,7 @@
           <a:p>
             <a:fld id="{1540B91B-16B7-420D-92EE-189A5973844B}" type="datetimeFigureOut">
               <a:rPr lang="de-CH" smtClean="0"/>
-              <a:t>19.11.2023</a:t>
+              <a:t>17.12.2023</a:t>
             </a:fld>
             <a:endParaRPr lang="de-CH"/>
           </a:p>
@@ -1883,7 +1883,7 @@
           <a:p>
             <a:fld id="{1540B91B-16B7-420D-92EE-189A5973844B}" type="datetimeFigureOut">
               <a:rPr lang="de-CH" smtClean="0"/>
-              <a:t>19.11.2023</a:t>
+              <a:t>17.12.2023</a:t>
             </a:fld>
             <a:endParaRPr lang="de-CH"/>
           </a:p>
@@ -2083,7 +2083,7 @@
           <a:p>
             <a:fld id="{1540B91B-16B7-420D-92EE-189A5973844B}" type="datetimeFigureOut">
               <a:rPr lang="de-CH" smtClean="0"/>
-              <a:t>19.11.2023</a:t>
+              <a:t>17.12.2023</a:t>
             </a:fld>
             <a:endParaRPr lang="de-CH"/>
           </a:p>
@@ -2359,7 +2359,7 @@
           <a:p>
             <a:fld id="{1540B91B-16B7-420D-92EE-189A5973844B}" type="datetimeFigureOut">
               <a:rPr lang="de-CH" smtClean="0"/>
-              <a:t>19.11.2023</a:t>
+              <a:t>17.12.2023</a:t>
             </a:fld>
             <a:endParaRPr lang="de-CH"/>
           </a:p>
@@ -2627,7 +2627,7 @@
           <a:p>
             <a:fld id="{1540B91B-16B7-420D-92EE-189A5973844B}" type="datetimeFigureOut">
               <a:rPr lang="de-CH" smtClean="0"/>
-              <a:t>19.11.2023</a:t>
+              <a:t>17.12.2023</a:t>
             </a:fld>
             <a:endParaRPr lang="de-CH"/>
           </a:p>
@@ -3042,7 +3042,7 @@
           <a:p>
             <a:fld id="{1540B91B-16B7-420D-92EE-189A5973844B}" type="datetimeFigureOut">
               <a:rPr lang="de-CH" smtClean="0"/>
-              <a:t>19.11.2023</a:t>
+              <a:t>17.12.2023</a:t>
             </a:fld>
             <a:endParaRPr lang="de-CH"/>
           </a:p>
@@ -3184,7 +3184,7 @@
           <a:p>
             <a:fld id="{1540B91B-16B7-420D-92EE-189A5973844B}" type="datetimeFigureOut">
               <a:rPr lang="de-CH" smtClean="0"/>
-              <a:t>19.11.2023</a:t>
+              <a:t>17.12.2023</a:t>
             </a:fld>
             <a:endParaRPr lang="de-CH"/>
           </a:p>
@@ -3297,7 +3297,7 @@
           <a:p>
             <a:fld id="{1540B91B-16B7-420D-92EE-189A5973844B}" type="datetimeFigureOut">
               <a:rPr lang="de-CH" smtClean="0"/>
-              <a:t>19.11.2023</a:t>
+              <a:t>17.12.2023</a:t>
             </a:fld>
             <a:endParaRPr lang="de-CH"/>
           </a:p>
@@ -3610,7 +3610,7 @@
           <a:p>
             <a:fld id="{1540B91B-16B7-420D-92EE-189A5973844B}" type="datetimeFigureOut">
               <a:rPr lang="de-CH" smtClean="0"/>
-              <a:t>19.11.2023</a:t>
+              <a:t>17.12.2023</a:t>
             </a:fld>
             <a:endParaRPr lang="de-CH"/>
           </a:p>
@@ -3899,7 +3899,7 @@
           <a:p>
             <a:fld id="{1540B91B-16B7-420D-92EE-189A5973844B}" type="datetimeFigureOut">
               <a:rPr lang="de-CH" smtClean="0"/>
-              <a:t>19.11.2023</a:t>
+              <a:t>17.12.2023</a:t>
             </a:fld>
             <a:endParaRPr lang="de-CH"/>
           </a:p>
@@ -4142,7 +4142,7 @@
           <a:p>
             <a:fld id="{1540B91B-16B7-420D-92EE-189A5973844B}" type="datetimeFigureOut">
               <a:rPr lang="de-CH" smtClean="0"/>
-              <a:t>19.11.2023</a:t>
+              <a:t>17.12.2023</a:t>
             </a:fld>
             <a:endParaRPr lang="de-CH"/>
           </a:p>

</xml_diff>